<commit_message>
First draft of 2.5.0 Documentation changes
</commit_message>
<xml_diff>
--- a/Documentation/ProfilesRNS_DataFlowDiagram.pptx
+++ b/Documentation/ProfilesRNS_DataFlowDiagram.pptx
@@ -305,7 +305,7 @@
             <a:fld id="{72957018-D432-EA46-BFF1-2153CC7DE60B}" type="datetimeFigureOut">
               <a:rPr lang="en-US" smtClean="0"/>
               <a:pPr/>
-              <a:t>7/21/2014</a:t>
+              <a:t>8/2/2014</a:t>
             </a:fld>
             <a:endParaRPr lang="en-US"/>
           </a:p>
@@ -477,7 +477,7 @@
             <a:fld id="{72957018-D432-EA46-BFF1-2153CC7DE60B}" type="datetimeFigureOut">
               <a:rPr lang="en-US" smtClean="0"/>
               <a:pPr/>
-              <a:t>7/21/2014</a:t>
+              <a:t>8/2/2014</a:t>
             </a:fld>
             <a:endParaRPr lang="en-US"/>
           </a:p>
@@ -659,7 +659,7 @@
             <a:fld id="{72957018-D432-EA46-BFF1-2153CC7DE60B}" type="datetimeFigureOut">
               <a:rPr lang="en-US" smtClean="0"/>
               <a:pPr/>
-              <a:t>7/21/2014</a:t>
+              <a:t>8/2/2014</a:t>
             </a:fld>
             <a:endParaRPr lang="en-US"/>
           </a:p>
@@ -831,7 +831,7 @@
             <a:fld id="{72957018-D432-EA46-BFF1-2153CC7DE60B}" type="datetimeFigureOut">
               <a:rPr lang="en-US" smtClean="0"/>
               <a:pPr/>
-              <a:t>7/21/2014</a:t>
+              <a:t>8/2/2014</a:t>
             </a:fld>
             <a:endParaRPr lang="en-US"/>
           </a:p>
@@ -1079,7 +1079,7 @@
             <a:fld id="{72957018-D432-EA46-BFF1-2153CC7DE60B}" type="datetimeFigureOut">
               <a:rPr lang="en-US" smtClean="0"/>
               <a:pPr/>
-              <a:t>7/21/2014</a:t>
+              <a:t>8/2/2014</a:t>
             </a:fld>
             <a:endParaRPr lang="en-US"/>
           </a:p>
@@ -1369,7 +1369,7 @@
             <a:fld id="{72957018-D432-EA46-BFF1-2153CC7DE60B}" type="datetimeFigureOut">
               <a:rPr lang="en-US" smtClean="0"/>
               <a:pPr/>
-              <a:t>7/21/2014</a:t>
+              <a:t>8/2/2014</a:t>
             </a:fld>
             <a:endParaRPr lang="en-US"/>
           </a:p>
@@ -1793,7 +1793,7 @@
             <a:fld id="{72957018-D432-EA46-BFF1-2153CC7DE60B}" type="datetimeFigureOut">
               <a:rPr lang="en-US" smtClean="0"/>
               <a:pPr/>
-              <a:t>7/21/2014</a:t>
+              <a:t>8/2/2014</a:t>
             </a:fld>
             <a:endParaRPr lang="en-US"/>
           </a:p>
@@ -1913,7 +1913,7 @@
             <a:fld id="{72957018-D432-EA46-BFF1-2153CC7DE60B}" type="datetimeFigureOut">
               <a:rPr lang="en-US" smtClean="0"/>
               <a:pPr/>
-              <a:t>7/21/2014</a:t>
+              <a:t>8/2/2014</a:t>
             </a:fld>
             <a:endParaRPr lang="en-US"/>
           </a:p>
@@ -2010,7 +2010,7 @@
             <a:fld id="{72957018-D432-EA46-BFF1-2153CC7DE60B}" type="datetimeFigureOut">
               <a:rPr lang="en-US" smtClean="0"/>
               <a:pPr/>
-              <a:t>7/21/2014</a:t>
+              <a:t>8/2/2014</a:t>
             </a:fld>
             <a:endParaRPr lang="en-US"/>
           </a:p>
@@ -2289,7 +2289,7 @@
             <a:fld id="{72957018-D432-EA46-BFF1-2153CC7DE60B}" type="datetimeFigureOut">
               <a:rPr lang="en-US" smtClean="0"/>
               <a:pPr/>
-              <a:t>7/21/2014</a:t>
+              <a:t>8/2/2014</a:t>
             </a:fld>
             <a:endParaRPr lang="en-US"/>
           </a:p>
@@ -2544,7 +2544,7 @@
             <a:fld id="{72957018-D432-EA46-BFF1-2153CC7DE60B}" type="datetimeFigureOut">
               <a:rPr lang="en-US" smtClean="0"/>
               <a:pPr/>
-              <a:t>7/21/2014</a:t>
+              <a:t>8/2/2014</a:t>
             </a:fld>
             <a:endParaRPr lang="en-US"/>
           </a:p>
@@ -2759,7 +2759,7 @@
             <a:fld id="{72957018-D432-EA46-BFF1-2153CC7DE60B}" type="datetimeFigureOut">
               <a:rPr lang="en-US" smtClean="0"/>
               <a:pPr/>
-              <a:t>7/21/2014</a:t>
+              <a:t>8/2/2014</a:t>
             </a:fld>
             <a:endParaRPr lang="en-US"/>
           </a:p>
@@ -8028,7 +8028,7 @@
             </a:r>
             <a:r>
               <a:rPr lang="en-US" sz="2400" smtClean="0"/>
-              <a:t>2.1.0 </a:t>
+              <a:t>2.5.0 </a:t>
             </a:r>
             <a:r>
               <a:rPr lang="en-US" sz="2400" dirty="0" smtClean="0"/>

</xml_diff>

<commit_message>
v3.1.0 documentation initial commit.
</commit_message>
<xml_diff>
--- a/Documentation/ProfilesRNS_DataFlowDiagram.pptx
+++ b/Documentation/ProfilesRNS_DataFlowDiagram.pptx
@@ -303,7 +303,7 @@
             <a:fld id="{72957018-D432-EA46-BFF1-2153CC7DE60B}" type="datetimeFigureOut">
               <a:rPr lang="en-US" smtClean="0"/>
               <a:pPr/>
-              <a:t>4/6/2020</a:t>
+              <a:t>5/5/2021</a:t>
             </a:fld>
             <a:endParaRPr lang="en-US"/>
           </a:p>
@@ -473,7 +473,7 @@
             <a:fld id="{72957018-D432-EA46-BFF1-2153CC7DE60B}" type="datetimeFigureOut">
               <a:rPr lang="en-US" smtClean="0"/>
               <a:pPr/>
-              <a:t>4/6/2020</a:t>
+              <a:t>5/5/2021</a:t>
             </a:fld>
             <a:endParaRPr lang="en-US"/>
           </a:p>
@@ -653,7 +653,7 @@
             <a:fld id="{72957018-D432-EA46-BFF1-2153CC7DE60B}" type="datetimeFigureOut">
               <a:rPr lang="en-US" smtClean="0"/>
               <a:pPr/>
-              <a:t>4/6/2020</a:t>
+              <a:t>5/5/2021</a:t>
             </a:fld>
             <a:endParaRPr lang="en-US"/>
           </a:p>
@@ -823,7 +823,7 @@
             <a:fld id="{72957018-D432-EA46-BFF1-2153CC7DE60B}" type="datetimeFigureOut">
               <a:rPr lang="en-US" smtClean="0"/>
               <a:pPr/>
-              <a:t>4/6/2020</a:t>
+              <a:t>5/5/2021</a:t>
             </a:fld>
             <a:endParaRPr lang="en-US"/>
           </a:p>
@@ -1070,7 +1070,7 @@
             <a:fld id="{72957018-D432-EA46-BFF1-2153CC7DE60B}" type="datetimeFigureOut">
               <a:rPr lang="en-US" smtClean="0"/>
               <a:pPr/>
-              <a:t>4/6/2020</a:t>
+              <a:t>5/5/2021</a:t>
             </a:fld>
             <a:endParaRPr lang="en-US"/>
           </a:p>
@@ -1357,7 +1357,7 @@
             <a:fld id="{72957018-D432-EA46-BFF1-2153CC7DE60B}" type="datetimeFigureOut">
               <a:rPr lang="en-US" smtClean="0"/>
               <a:pPr/>
-              <a:t>4/6/2020</a:t>
+              <a:t>5/5/2021</a:t>
             </a:fld>
             <a:endParaRPr lang="en-US"/>
           </a:p>
@@ -1778,7 +1778,7 @@
             <a:fld id="{72957018-D432-EA46-BFF1-2153CC7DE60B}" type="datetimeFigureOut">
               <a:rPr lang="en-US" smtClean="0"/>
               <a:pPr/>
-              <a:t>4/6/2020</a:t>
+              <a:t>5/5/2021</a:t>
             </a:fld>
             <a:endParaRPr lang="en-US"/>
           </a:p>
@@ -1897,7 +1897,7 @@
             <a:fld id="{72957018-D432-EA46-BFF1-2153CC7DE60B}" type="datetimeFigureOut">
               <a:rPr lang="en-US" smtClean="0"/>
               <a:pPr/>
-              <a:t>4/6/2020</a:t>
+              <a:t>5/5/2021</a:t>
             </a:fld>
             <a:endParaRPr lang="en-US"/>
           </a:p>
@@ -1994,7 +1994,7 @@
             <a:fld id="{72957018-D432-EA46-BFF1-2153CC7DE60B}" type="datetimeFigureOut">
               <a:rPr lang="en-US" smtClean="0"/>
               <a:pPr/>
-              <a:t>4/6/2020</a:t>
+              <a:t>5/5/2021</a:t>
             </a:fld>
             <a:endParaRPr lang="en-US"/>
           </a:p>
@@ -2271,7 +2271,7 @@
             <a:fld id="{72957018-D432-EA46-BFF1-2153CC7DE60B}" type="datetimeFigureOut">
               <a:rPr lang="en-US" smtClean="0"/>
               <a:pPr/>
-              <a:t>4/6/2020</a:t>
+              <a:t>5/5/2021</a:t>
             </a:fld>
             <a:endParaRPr lang="en-US"/>
           </a:p>
@@ -2525,7 +2525,7 @@
             <a:fld id="{72957018-D432-EA46-BFF1-2153CC7DE60B}" type="datetimeFigureOut">
               <a:rPr lang="en-US" smtClean="0"/>
               <a:pPr/>
-              <a:t>4/6/2020</a:t>
+              <a:t>5/5/2021</a:t>
             </a:fld>
             <a:endParaRPr lang="en-US"/>
           </a:p>
@@ -2738,7 +2738,7 @@
             <a:fld id="{72957018-D432-EA46-BFF1-2153CC7DE60B}" type="datetimeFigureOut">
               <a:rPr lang="en-US" smtClean="0"/>
               <a:pPr/>
-              <a:t>4/6/2020</a:t>
+              <a:t>5/5/2021</a:t>
             </a:fld>
             <a:endParaRPr lang="en-US"/>
           </a:p>
@@ -7813,7 +7813,15 @@
             <a:pPr algn="ctr"/>
             <a:r>
               <a:rPr lang="en-US" sz="2400" dirty="0"/>
-              <a:t>Profiles RNS 3.0.0 Installation Data Flow Diagram</a:t>
+              <a:t>Profiles </a:t>
+            </a:r>
+            <a:r>
+              <a:rPr lang="en-US" sz="2400"/>
+              <a:t>RNS 3.1.0 </a:t>
+            </a:r>
+            <a:r>
+              <a:rPr lang="en-US" sz="2400" dirty="0"/>
+              <a:t>Installation Data Flow Diagram</a:t>
             </a:r>
           </a:p>
         </p:txBody>

</xml_diff>